<commit_message>
more banners, update powerpoint, logo for toronto
</commit_message>
<xml_diff>
--- a/general/powerpoint/powerpoint.pptx
+++ b/general/powerpoint/powerpoint.pptx
@@ -277,7 +277,7 @@
           <a:p>
             <a:fld id="{353C901E-8B38-4472-B8D1-0CCEEDBD62F6}" type="datetimeFigureOut">
               <a:rPr lang="en-CA" smtClean="0"/>
-              <a:t>2019-01-25</a:t>
+              <a:t>2019-01-29</a:t>
             </a:fld>
             <a:endParaRPr lang="en-CA"/>
           </a:p>
@@ -477,7 +477,7 @@
           <a:p>
             <a:fld id="{353C901E-8B38-4472-B8D1-0CCEEDBD62F6}" type="datetimeFigureOut">
               <a:rPr lang="en-CA" smtClean="0"/>
-              <a:t>2019-01-25</a:t>
+              <a:t>2019-01-29</a:t>
             </a:fld>
             <a:endParaRPr lang="en-CA"/>
           </a:p>
@@ -687,7 +687,7 @@
           <a:p>
             <a:fld id="{353C901E-8B38-4472-B8D1-0CCEEDBD62F6}" type="datetimeFigureOut">
               <a:rPr lang="en-CA" smtClean="0"/>
-              <a:t>2019-01-25</a:t>
+              <a:t>2019-01-29</a:t>
             </a:fld>
             <a:endParaRPr lang="en-CA"/>
           </a:p>
@@ -887,7 +887,7 @@
           <a:p>
             <a:fld id="{353C901E-8B38-4472-B8D1-0CCEEDBD62F6}" type="datetimeFigureOut">
               <a:rPr lang="en-CA" smtClean="0"/>
-              <a:t>2019-01-25</a:t>
+              <a:t>2019-01-29</a:t>
             </a:fld>
             <a:endParaRPr lang="en-CA"/>
           </a:p>
@@ -1163,7 +1163,7 @@
           <a:p>
             <a:fld id="{353C901E-8B38-4472-B8D1-0CCEEDBD62F6}" type="datetimeFigureOut">
               <a:rPr lang="en-CA" smtClean="0"/>
-              <a:t>2019-01-25</a:t>
+              <a:t>2019-01-29</a:t>
             </a:fld>
             <a:endParaRPr lang="en-CA"/>
           </a:p>
@@ -1431,7 +1431,7 @@
           <a:p>
             <a:fld id="{353C901E-8B38-4472-B8D1-0CCEEDBD62F6}" type="datetimeFigureOut">
               <a:rPr lang="en-CA" smtClean="0"/>
-              <a:t>2019-01-25</a:t>
+              <a:t>2019-01-29</a:t>
             </a:fld>
             <a:endParaRPr lang="en-CA"/>
           </a:p>
@@ -1846,7 +1846,7 @@
           <a:p>
             <a:fld id="{353C901E-8B38-4472-B8D1-0CCEEDBD62F6}" type="datetimeFigureOut">
               <a:rPr lang="en-CA" smtClean="0"/>
-              <a:t>2019-01-25</a:t>
+              <a:t>2019-01-29</a:t>
             </a:fld>
             <a:endParaRPr lang="en-CA"/>
           </a:p>
@@ -1988,7 +1988,7 @@
           <a:p>
             <a:fld id="{353C901E-8B38-4472-B8D1-0CCEEDBD62F6}" type="datetimeFigureOut">
               <a:rPr lang="en-CA" smtClean="0"/>
-              <a:t>2019-01-25</a:t>
+              <a:t>2019-01-29</a:t>
             </a:fld>
             <a:endParaRPr lang="en-CA"/>
           </a:p>
@@ -2101,7 +2101,7 @@
           <a:p>
             <a:fld id="{353C901E-8B38-4472-B8D1-0CCEEDBD62F6}" type="datetimeFigureOut">
               <a:rPr lang="en-CA" smtClean="0"/>
-              <a:t>2019-01-25</a:t>
+              <a:t>2019-01-29</a:t>
             </a:fld>
             <a:endParaRPr lang="en-CA"/>
           </a:p>
@@ -2414,7 +2414,7 @@
           <a:p>
             <a:fld id="{353C901E-8B38-4472-B8D1-0CCEEDBD62F6}" type="datetimeFigureOut">
               <a:rPr lang="en-CA" smtClean="0"/>
-              <a:t>2019-01-25</a:t>
+              <a:t>2019-01-29</a:t>
             </a:fld>
             <a:endParaRPr lang="en-CA"/>
           </a:p>
@@ -2703,7 +2703,7 @@
           <a:p>
             <a:fld id="{353C901E-8B38-4472-B8D1-0CCEEDBD62F6}" type="datetimeFigureOut">
               <a:rPr lang="en-CA" smtClean="0"/>
-              <a:t>2019-01-25</a:t>
+              <a:t>2019-01-29</a:t>
             </a:fld>
             <a:endParaRPr lang="en-CA"/>
           </a:p>
@@ -2946,7 +2946,7 @@
           <a:p>
             <a:fld id="{353C901E-8B38-4472-B8D1-0CCEEDBD62F6}" type="datetimeFigureOut">
               <a:rPr lang="en-CA" smtClean="0"/>
-              <a:t>2019-01-25</a:t>
+              <a:t>2019-01-29</a:t>
             </a:fld>
             <a:endParaRPr lang="en-CA"/>
           </a:p>
@@ -4156,14 +4156,17 @@
               <a:rPr lang="en-US" sz="2400" b="1" dirty="0">
                 <a:latin typeface="Fira Sans" panose="020B0503050000020004" pitchFamily="34" charset="0"/>
               </a:rPr>
-              <a:t>Consistency:</a:t>
+              <a:t>Respect for Tactics and Organizers:</a:t>
             </a:r>
             <a:r>
               <a:rPr lang="en-US" sz="2400" dirty="0">
                 <a:latin typeface="Fira Sans" panose="020B0503050000020004" pitchFamily="34" charset="0"/>
               </a:rPr>
-              <a:t> Earth Strike is open only to those whose views and actions are compatible with our missions. In particular, we do not support worker exploitation or landlordism, nor do we permit the presence of, or support for, police or current state armed forces.</a:t>
-            </a:r>
+              <a:t> Our solidarity will be based on respect for a diversity of tactics. Any debates or criticisms will stay internal to the movement. That said, we oppose any state repression of dissent, including surveillance, infiltration, disruption and violence, and agree not to assist law enforcement actions against activists and others.</a:t>
+            </a:r>
+            <a:endParaRPr lang="en-US" sz="2400" b="1" dirty="0">
+              <a:latin typeface="Fira Sans" panose="020B0503050000020004" pitchFamily="34" charset="0"/>
+            </a:endParaRPr>
           </a:p>
           <a:p>
             <a:r>

</xml_diff>